<commit_message>
added transistor space slide
</commit_message>
<xml_diff>
--- a/cuda_tut.pptx
+++ b/cuda_tut.pptx
@@ -8,15 +8,16 @@
     <p:sldId id="256" r:id="rId2"/>
     <p:sldId id="257" r:id="rId3"/>
     <p:sldId id="262" r:id="rId4"/>
-    <p:sldId id="258" r:id="rId5"/>
-    <p:sldId id="268" r:id="rId6"/>
-    <p:sldId id="261" r:id="rId7"/>
-    <p:sldId id="265" r:id="rId8"/>
-    <p:sldId id="260" r:id="rId9"/>
-    <p:sldId id="264" r:id="rId10"/>
-    <p:sldId id="263" r:id="rId11"/>
-    <p:sldId id="267" r:id="rId12"/>
-    <p:sldId id="266" r:id="rId13"/>
+    <p:sldId id="269" r:id="rId5"/>
+    <p:sldId id="258" r:id="rId6"/>
+    <p:sldId id="268" r:id="rId7"/>
+    <p:sldId id="261" r:id="rId8"/>
+    <p:sldId id="265" r:id="rId9"/>
+    <p:sldId id="260" r:id="rId10"/>
+    <p:sldId id="264" r:id="rId11"/>
+    <p:sldId id="263" r:id="rId12"/>
+    <p:sldId id="267" r:id="rId13"/>
+    <p:sldId id="266" r:id="rId14"/>
   </p:sldIdLst>
   <p:sldSz cx="9144000" cy="6858000" type="screen4x3"/>
   <p:notesSz cx="6858000" cy="9144000"/>
@@ -3212,7 +3213,7 @@
           <a:p>
             <a:r>
               <a:rPr lang="en-US" dirty="0" smtClean="0"/>
-              <a:t>A Kernel</a:t>
+              <a:t>Launching a Kernel From the Host</a:t>
             </a:r>
             <a:endParaRPr lang="en-US" dirty="0"/>
           </a:p>
@@ -3230,8 +3231,8 @@
         </p:nvSpPr>
         <p:spPr>
           <a:xfrm>
-            <a:off x="457201" y="1600200"/>
-            <a:ext cx="3191960" cy="4525963"/>
+            <a:off x="457200" y="1600200"/>
+            <a:ext cx="8229600" cy="4820977"/>
           </a:xfrm>
         </p:spPr>
         <p:txBody>
@@ -3240,297 +3241,135 @@
           </a:bodyPr>
           <a:lstStyle/>
           <a:p>
-            <a:r>
-              <a:rPr lang="en-US" sz="2400" dirty="0" smtClean="0"/>
-              <a:t>Predefined local values </a:t>
-            </a:r>
-          </a:p>
-          <a:p>
-            <a:pPr lvl="1"/>
+            <a:pPr marL="0" indent="0">
+              <a:buNone/>
+            </a:pPr>
+            <a:endParaRPr lang="en-US" sz="2200" dirty="0" smtClean="0"/>
+          </a:p>
+          <a:p>
+            <a:pPr marL="0" indent="0">
+              <a:buNone/>
+            </a:pPr>
+            <a:r>
+              <a:rPr lang="en-US" sz="2200" dirty="0" smtClean="0"/>
+              <a:t>kernel &lt;&lt;&lt; </a:t>
+            </a:r>
+            <a:r>
+              <a:rPr lang="en-US" sz="2200" dirty="0" err="1" smtClean="0"/>
+              <a:t>grid_dimensions</a:t>
+            </a:r>
+            <a:r>
+              <a:rPr lang="en-US" sz="2200" dirty="0" smtClean="0"/>
+              <a:t>  , </a:t>
+            </a:r>
+            <a:r>
+              <a:rPr lang="en-US" sz="2400" dirty="0" err="1" smtClean="0"/>
+              <a:t>block</a:t>
+            </a:r>
+            <a:r>
+              <a:rPr lang="en-US" sz="2200" dirty="0" err="1" smtClean="0"/>
+              <a:t>_dimensions</a:t>
+            </a:r>
+            <a:r>
+              <a:rPr lang="en-US" sz="2200" dirty="0" smtClean="0"/>
+              <a:t> &gt;&gt;&gt; (arguments);</a:t>
+            </a:r>
+          </a:p>
+          <a:p>
+            <a:pPr marL="0" indent="0">
+              <a:buNone/>
+            </a:pPr>
+            <a:endParaRPr lang="en-US" sz="2000" dirty="0" smtClean="0"/>
+          </a:p>
+          <a:p>
+            <a:pPr marL="0" indent="0">
+              <a:buNone/>
+            </a:pPr>
+            <a:endParaRPr lang="en-US" sz="2000" dirty="0"/>
+          </a:p>
+          <a:p>
+            <a:pPr marL="0" indent="0">
+              <a:buNone/>
+            </a:pPr>
             <a:r>
               <a:rPr lang="en-US" sz="2000" dirty="0" smtClean="0"/>
-              <a:t>Used for thread identification and indexing</a:t>
-            </a:r>
-          </a:p>
-          <a:p>
-            <a:r>
-              <a:rPr lang="en-US" sz="2400" dirty="0" smtClean="0"/>
-              <a:t>__global__ </a:t>
-            </a:r>
-          </a:p>
-          <a:p>
-            <a:pPr lvl="1"/>
+              <a:t>kernel = the name of the kernel</a:t>
+            </a:r>
+          </a:p>
+          <a:p>
+            <a:pPr marL="0" indent="0">
+              <a:buNone/>
+            </a:pPr>
+            <a:r>
+              <a:rPr lang="en-US" sz="2000" dirty="0" err="1" smtClean="0"/>
+              <a:t>grid_dimensions</a:t>
+            </a:r>
             <a:r>
               <a:rPr lang="en-US" sz="2000" dirty="0" smtClean="0"/>
-              <a:t>GPU kernel to be launched from the host</a:t>
-            </a:r>
-          </a:p>
-          <a:p>
-            <a:r>
-              <a:rPr lang="en-US" sz="2400" dirty="0" smtClean="0"/>
-              <a:t>__device__ </a:t>
-            </a:r>
-          </a:p>
-          <a:p>
-            <a:pPr lvl="1"/>
+              <a:t> = dim3(</a:t>
+            </a:r>
+            <a:r>
+              <a:rPr lang="en-US" sz="2000" dirty="0" err="1" smtClean="0"/>
+              <a:t>x,y,z</a:t>
+            </a:r>
             <a:r>
               <a:rPr lang="en-US" sz="2000" dirty="0" smtClean="0"/>
-              <a:t>GPU function to be used within a kernel</a:t>
+              <a:t>) number of blocks in the (</a:t>
+            </a:r>
+            <a:r>
+              <a:rPr lang="en-US" sz="2000" dirty="0" err="1" smtClean="0"/>
+              <a:t>x,y,z</a:t>
+            </a:r>
+            <a:r>
+              <a:rPr lang="en-US" sz="2000" dirty="0" smtClean="0"/>
+              <a:t>) dimensions</a:t>
+            </a:r>
+          </a:p>
+          <a:p>
+            <a:pPr marL="0" indent="0">
+              <a:buNone/>
+            </a:pPr>
+            <a:r>
+              <a:rPr lang="en-US" sz="2000" dirty="0" err="1" smtClean="0"/>
+              <a:t>block_dimensions</a:t>
+            </a:r>
+            <a:r>
+              <a:rPr lang="en-US" sz="2000" dirty="0" smtClean="0"/>
+              <a:t> = dim3(</a:t>
+            </a:r>
+            <a:r>
+              <a:rPr lang="en-US" sz="2000" dirty="0" err="1" smtClean="0"/>
+              <a:t>x,y,z</a:t>
+            </a:r>
+            <a:r>
+              <a:rPr lang="en-US" sz="2000" dirty="0" smtClean="0"/>
+              <a:t>) number of threads in the (</a:t>
+            </a:r>
+            <a:r>
+              <a:rPr lang="en-US" sz="2000" dirty="0" err="1" smtClean="0"/>
+              <a:t>x,y,z</a:t>
+            </a:r>
+            <a:r>
+              <a:rPr lang="en-US" sz="2000" dirty="0" smtClean="0"/>
+              <a:t>) dimensions within a block</a:t>
+            </a:r>
+          </a:p>
+          <a:p>
+            <a:pPr marL="0" indent="0">
+              <a:buNone/>
+            </a:pPr>
+            <a:r>
+              <a:rPr lang="en-US" sz="2000" dirty="0" smtClean="0"/>
+              <a:t>arguments = input values, pointers to arrays, etc.</a:t>
             </a:r>
             <a:endParaRPr lang="en-US" sz="2000" dirty="0"/>
-          </a:p>
-        </p:txBody>
-      </p:sp>
-      <p:sp>
-        <p:nvSpPr>
-          <p:cNvPr id="4" name="TextBox 3"/>
-          <p:cNvSpPr txBox="1"/>
-          <p:nvPr/>
-        </p:nvSpPr>
-        <p:spPr>
-          <a:xfrm>
-            <a:off x="3858144" y="1600200"/>
-            <a:ext cx="5086361" cy="4801315"/>
-          </a:xfrm>
-          <a:prstGeom prst="rect">
-            <a:avLst/>
-          </a:prstGeom>
-          <a:noFill/>
-        </p:spPr>
-        <p:txBody>
-          <a:bodyPr wrap="none" rtlCol="0">
-            <a:spAutoFit/>
-          </a:bodyPr>
-          <a:lstStyle/>
-          <a:p>
-            <a:r>
-              <a:rPr lang="en-US" dirty="0" smtClean="0"/>
-              <a:t>__device__ float </a:t>
-            </a:r>
-            <a:r>
-              <a:rPr lang="en-US" dirty="0" err="1" smtClean="0"/>
-              <a:t>d_add</a:t>
-            </a:r>
-            <a:r>
-              <a:rPr lang="en-US" dirty="0" smtClean="0"/>
-              <a:t>(float a, float b){</a:t>
-            </a:r>
-            <a:endParaRPr lang="en-US" dirty="0"/>
-          </a:p>
-          <a:p>
-            <a:r>
-              <a:rPr lang="en-US" dirty="0" smtClean="0"/>
-              <a:t>	return </a:t>
-            </a:r>
-            <a:r>
-              <a:rPr lang="en-US" dirty="0" err="1" smtClean="0"/>
-              <a:t>a+b</a:t>
-            </a:r>
-            <a:r>
-              <a:rPr lang="en-US" dirty="0" smtClean="0"/>
-              <a:t>;</a:t>
-            </a:r>
-          </a:p>
-          <a:p>
-            <a:r>
-              <a:rPr lang="en-US" dirty="0" smtClean="0"/>
-              <a:t>}</a:t>
-            </a:r>
-            <a:endParaRPr lang="en-US" dirty="0"/>
-          </a:p>
-          <a:p>
-            <a:endParaRPr lang="en-US" dirty="0" smtClean="0"/>
-          </a:p>
-          <a:p>
-            <a:r>
-              <a:rPr lang="en-US" dirty="0" smtClean="0"/>
-              <a:t>__global__ void kernel( unsigned </a:t>
-            </a:r>
-            <a:r>
-              <a:rPr lang="en-US" dirty="0" err="1" smtClean="0"/>
-              <a:t>len</a:t>
-            </a:r>
-            <a:r>
-              <a:rPr lang="en-US" dirty="0" smtClean="0"/>
-              <a:t>, float* a){</a:t>
-            </a:r>
-          </a:p>
-          <a:p>
-            <a:endParaRPr lang="en-US" dirty="0" smtClean="0"/>
-          </a:p>
-          <a:p>
-            <a:r>
-              <a:rPr lang="en-US" dirty="0" smtClean="0"/>
-              <a:t>	// </a:t>
-            </a:r>
-            <a:r>
-              <a:rPr lang="en-US" dirty="0" smtClean="0"/>
-              <a:t>get thread </a:t>
-            </a:r>
-            <a:r>
-              <a:rPr lang="en-US" dirty="0" smtClean="0"/>
-              <a:t>index </a:t>
-            </a:r>
-          </a:p>
-          <a:p>
-            <a:r>
-              <a:rPr lang="en-US" dirty="0" smtClean="0"/>
-              <a:t>	</a:t>
-            </a:r>
-            <a:r>
-              <a:rPr lang="en-US" dirty="0" err="1" smtClean="0"/>
-              <a:t>int</a:t>
-            </a:r>
-            <a:r>
-              <a:rPr lang="en-US" dirty="0" smtClean="0"/>
-              <a:t> row = </a:t>
-            </a:r>
-            <a:r>
-              <a:rPr lang="en-US" dirty="0" err="1" smtClean="0"/>
-              <a:t>blockIdx.y</a:t>
-            </a:r>
-            <a:r>
-              <a:rPr lang="en-US" dirty="0" smtClean="0"/>
-              <a:t> * </a:t>
-            </a:r>
-            <a:r>
-              <a:rPr lang="en-US" dirty="0" err="1" smtClean="0"/>
-              <a:t>blockDim.y</a:t>
-            </a:r>
-            <a:r>
-              <a:rPr lang="en-US" dirty="0" smtClean="0"/>
-              <a:t> + </a:t>
-            </a:r>
-            <a:r>
-              <a:rPr lang="en-US" dirty="0" err="1" smtClean="0"/>
-              <a:t>threadIdx.y</a:t>
-            </a:r>
-            <a:r>
-              <a:rPr lang="en-US" dirty="0" smtClean="0"/>
-              <a:t>;</a:t>
-            </a:r>
-          </a:p>
-          <a:p>
-            <a:r>
-              <a:rPr lang="en-US" dirty="0" smtClean="0"/>
-              <a:t>	</a:t>
-            </a:r>
-            <a:r>
-              <a:rPr lang="en-US" dirty="0" err="1" smtClean="0"/>
-              <a:t>int</a:t>
-            </a:r>
-            <a:r>
-              <a:rPr lang="en-US" dirty="0" smtClean="0"/>
-              <a:t> col   = </a:t>
-            </a:r>
-            <a:r>
-              <a:rPr lang="en-US" dirty="0" err="1" smtClean="0"/>
-              <a:t>blockIdx.x</a:t>
-            </a:r>
-            <a:r>
-              <a:rPr lang="en-US" dirty="0" smtClean="0"/>
-              <a:t> * </a:t>
-            </a:r>
-            <a:r>
-              <a:rPr lang="en-US" dirty="0" err="1" smtClean="0"/>
-              <a:t>blockDim.x</a:t>
-            </a:r>
-            <a:r>
-              <a:rPr lang="en-US" dirty="0" smtClean="0"/>
-              <a:t> + </a:t>
-            </a:r>
-            <a:r>
-              <a:rPr lang="en-US" dirty="0" err="1" smtClean="0"/>
-              <a:t>threadIdx.x</a:t>
-            </a:r>
-            <a:r>
-              <a:rPr lang="en-US" dirty="0" smtClean="0"/>
-              <a:t>;</a:t>
-            </a:r>
-          </a:p>
-          <a:p>
-            <a:endParaRPr lang="en-US" dirty="0" smtClean="0"/>
-          </a:p>
-          <a:p>
-            <a:r>
-              <a:rPr lang="en-US" dirty="0" smtClean="0"/>
-              <a:t>	//return if over the length</a:t>
-            </a:r>
-          </a:p>
-          <a:p>
-            <a:r>
-              <a:rPr lang="en-US" dirty="0" smtClean="0"/>
-              <a:t>	if(row&gt;=</a:t>
-            </a:r>
-            <a:r>
-              <a:rPr lang="en-US" dirty="0" err="1" smtClean="0"/>
-              <a:t>len</a:t>
-            </a:r>
-            <a:r>
-              <a:rPr lang="en-US" dirty="0" smtClean="0"/>
-              <a:t> | col&gt;=</a:t>
-            </a:r>
-            <a:r>
-              <a:rPr lang="en-US" dirty="0" err="1" smtClean="0"/>
-              <a:t>len</a:t>
-            </a:r>
-            <a:r>
-              <a:rPr lang="en-US" dirty="0" smtClean="0"/>
-              <a:t>){return;}</a:t>
-            </a:r>
-          </a:p>
-          <a:p>
-            <a:endParaRPr lang="en-US" dirty="0" smtClean="0"/>
-          </a:p>
-          <a:p>
-            <a:r>
-              <a:rPr lang="en-US" dirty="0"/>
-              <a:t>	</a:t>
-            </a:r>
-            <a:r>
-              <a:rPr lang="en-US" dirty="0" smtClean="0"/>
-              <a:t>// do something…</a:t>
-            </a:r>
-            <a:endParaRPr lang="en-US" dirty="0"/>
-          </a:p>
-          <a:p>
-            <a:r>
-              <a:rPr lang="en-US" dirty="0" smtClean="0"/>
-              <a:t>	a[row*</a:t>
-            </a:r>
-            <a:r>
-              <a:rPr lang="en-US" dirty="0" err="1" smtClean="0"/>
-              <a:t>len</a:t>
-            </a:r>
-            <a:r>
-              <a:rPr lang="en-US" dirty="0" smtClean="0"/>
-              <a:t> + col] = </a:t>
-            </a:r>
-            <a:r>
-              <a:rPr lang="en-US" dirty="0" err="1" smtClean="0"/>
-              <a:t>d_add</a:t>
-            </a:r>
-            <a:r>
-              <a:rPr lang="en-US" dirty="0" smtClean="0"/>
-              <a:t>(1,2);</a:t>
-            </a:r>
-          </a:p>
-          <a:p>
-            <a:endParaRPr lang="en-US" dirty="0"/>
-          </a:p>
-          <a:p>
-            <a:r>
-              <a:rPr lang="en-US" dirty="0" smtClean="0"/>
-              <a:t>}</a:t>
-            </a:r>
-            <a:endParaRPr lang="en-US" dirty="0"/>
           </a:p>
         </p:txBody>
       </p:sp>
     </p:spTree>
     <p:extLst>
       <p:ext uri="{BB962C8B-B14F-4D97-AF65-F5344CB8AC3E}">
-        <p14:creationId xmlns:p14="http://schemas.microsoft.com/office/powerpoint/2010/main" val="1080336790"/>
+        <p14:creationId xmlns:p14="http://schemas.microsoft.com/office/powerpoint/2010/main" val="1041839434"/>
       </p:ext>
     </p:extLst>
   </p:cSld>
@@ -3574,6 +3413,360 @@
           <a:p>
             <a:r>
               <a:rPr lang="en-US" dirty="0" smtClean="0"/>
+              <a:t>A Kernel</a:t>
+            </a:r>
+            <a:endParaRPr lang="en-US" dirty="0"/>
+          </a:p>
+        </p:txBody>
+      </p:sp>
+      <p:sp>
+        <p:nvSpPr>
+          <p:cNvPr id="3" name="Content Placeholder 2"/>
+          <p:cNvSpPr>
+            <a:spLocks noGrp="1"/>
+          </p:cNvSpPr>
+          <p:nvPr>
+            <p:ph idx="1"/>
+          </p:nvPr>
+        </p:nvSpPr>
+        <p:spPr>
+          <a:xfrm>
+            <a:off x="457201" y="1600200"/>
+            <a:ext cx="3191960" cy="4525963"/>
+          </a:xfrm>
+        </p:spPr>
+        <p:txBody>
+          <a:bodyPr>
+            <a:normAutofit/>
+          </a:bodyPr>
+          <a:lstStyle/>
+          <a:p>
+            <a:r>
+              <a:rPr lang="en-US" sz="2400" dirty="0" smtClean="0"/>
+              <a:t>Predefined local values </a:t>
+            </a:r>
+          </a:p>
+          <a:p>
+            <a:pPr lvl="1"/>
+            <a:r>
+              <a:rPr lang="en-US" sz="2000" dirty="0" smtClean="0"/>
+              <a:t>Used for thread identification and indexing</a:t>
+            </a:r>
+          </a:p>
+          <a:p>
+            <a:r>
+              <a:rPr lang="en-US" sz="2400" dirty="0" smtClean="0"/>
+              <a:t>__global__ </a:t>
+            </a:r>
+          </a:p>
+          <a:p>
+            <a:pPr lvl="1"/>
+            <a:r>
+              <a:rPr lang="en-US" sz="2000" dirty="0" smtClean="0"/>
+              <a:t>GPU kernel to be launched from the host</a:t>
+            </a:r>
+          </a:p>
+          <a:p>
+            <a:r>
+              <a:rPr lang="en-US" sz="2400" dirty="0" smtClean="0"/>
+              <a:t>__device__ </a:t>
+            </a:r>
+          </a:p>
+          <a:p>
+            <a:pPr lvl="1"/>
+            <a:r>
+              <a:rPr lang="en-US" sz="2000" dirty="0" smtClean="0"/>
+              <a:t>GPU function to be used within a kernel</a:t>
+            </a:r>
+            <a:endParaRPr lang="en-US" sz="2000" dirty="0"/>
+          </a:p>
+        </p:txBody>
+      </p:sp>
+      <p:sp>
+        <p:nvSpPr>
+          <p:cNvPr id="4" name="TextBox 3"/>
+          <p:cNvSpPr txBox="1"/>
+          <p:nvPr/>
+        </p:nvSpPr>
+        <p:spPr>
+          <a:xfrm>
+            <a:off x="3858144" y="1600200"/>
+            <a:ext cx="5086361" cy="4801315"/>
+          </a:xfrm>
+          <a:prstGeom prst="rect">
+            <a:avLst/>
+          </a:prstGeom>
+          <a:noFill/>
+        </p:spPr>
+        <p:txBody>
+          <a:bodyPr wrap="none" rtlCol="0">
+            <a:spAutoFit/>
+          </a:bodyPr>
+          <a:lstStyle/>
+          <a:p>
+            <a:r>
+              <a:rPr lang="en-US" dirty="0" smtClean="0"/>
+              <a:t>__device__ float </a:t>
+            </a:r>
+            <a:r>
+              <a:rPr lang="en-US" dirty="0" err="1" smtClean="0"/>
+              <a:t>d_add</a:t>
+            </a:r>
+            <a:r>
+              <a:rPr lang="en-US" dirty="0" smtClean="0"/>
+              <a:t>(float a, float b){</a:t>
+            </a:r>
+            <a:endParaRPr lang="en-US" dirty="0"/>
+          </a:p>
+          <a:p>
+            <a:r>
+              <a:rPr lang="en-US" dirty="0" smtClean="0"/>
+              <a:t>	return </a:t>
+            </a:r>
+            <a:r>
+              <a:rPr lang="en-US" dirty="0" err="1" smtClean="0"/>
+              <a:t>a+b</a:t>
+            </a:r>
+            <a:r>
+              <a:rPr lang="en-US" dirty="0" smtClean="0"/>
+              <a:t>;</a:t>
+            </a:r>
+          </a:p>
+          <a:p>
+            <a:r>
+              <a:rPr lang="en-US" dirty="0" smtClean="0"/>
+              <a:t>}</a:t>
+            </a:r>
+            <a:endParaRPr lang="en-US" dirty="0"/>
+          </a:p>
+          <a:p>
+            <a:endParaRPr lang="en-US" dirty="0" smtClean="0"/>
+          </a:p>
+          <a:p>
+            <a:r>
+              <a:rPr lang="en-US" dirty="0" smtClean="0"/>
+              <a:t>__global__ void kernel( unsigned </a:t>
+            </a:r>
+            <a:r>
+              <a:rPr lang="en-US" dirty="0" err="1" smtClean="0"/>
+              <a:t>len</a:t>
+            </a:r>
+            <a:r>
+              <a:rPr lang="en-US" dirty="0" smtClean="0"/>
+              <a:t>, float* a){</a:t>
+            </a:r>
+          </a:p>
+          <a:p>
+            <a:endParaRPr lang="en-US" dirty="0" smtClean="0"/>
+          </a:p>
+          <a:p>
+            <a:r>
+              <a:rPr lang="en-US" dirty="0" smtClean="0"/>
+              <a:t>	// get thread index </a:t>
+            </a:r>
+          </a:p>
+          <a:p>
+            <a:r>
+              <a:rPr lang="en-US" dirty="0" smtClean="0"/>
+              <a:t>	</a:t>
+            </a:r>
+            <a:r>
+              <a:rPr lang="en-US" dirty="0" err="1" smtClean="0"/>
+              <a:t>int</a:t>
+            </a:r>
+            <a:r>
+              <a:rPr lang="en-US" dirty="0" smtClean="0"/>
+              <a:t> row = </a:t>
+            </a:r>
+            <a:r>
+              <a:rPr lang="en-US" dirty="0" err="1" smtClean="0"/>
+              <a:t>blockIdx.y</a:t>
+            </a:r>
+            <a:r>
+              <a:rPr lang="en-US" dirty="0" smtClean="0"/>
+              <a:t> * </a:t>
+            </a:r>
+            <a:r>
+              <a:rPr lang="en-US" dirty="0" err="1" smtClean="0"/>
+              <a:t>blockDim.y</a:t>
+            </a:r>
+            <a:r>
+              <a:rPr lang="en-US" dirty="0" smtClean="0"/>
+              <a:t> + </a:t>
+            </a:r>
+            <a:r>
+              <a:rPr lang="en-US" dirty="0" err="1" smtClean="0"/>
+              <a:t>threadIdx.y</a:t>
+            </a:r>
+            <a:r>
+              <a:rPr lang="en-US" dirty="0" smtClean="0"/>
+              <a:t>;</a:t>
+            </a:r>
+          </a:p>
+          <a:p>
+            <a:r>
+              <a:rPr lang="en-US" dirty="0" smtClean="0"/>
+              <a:t>	</a:t>
+            </a:r>
+            <a:r>
+              <a:rPr lang="en-US" dirty="0" err="1" smtClean="0"/>
+              <a:t>int</a:t>
+            </a:r>
+            <a:r>
+              <a:rPr lang="en-US" dirty="0" smtClean="0"/>
+              <a:t> col   = </a:t>
+            </a:r>
+            <a:r>
+              <a:rPr lang="en-US" dirty="0" err="1" smtClean="0"/>
+              <a:t>blockIdx.x</a:t>
+            </a:r>
+            <a:r>
+              <a:rPr lang="en-US" dirty="0" smtClean="0"/>
+              <a:t> * </a:t>
+            </a:r>
+            <a:r>
+              <a:rPr lang="en-US" dirty="0" err="1" smtClean="0"/>
+              <a:t>blockDim.x</a:t>
+            </a:r>
+            <a:r>
+              <a:rPr lang="en-US" dirty="0" smtClean="0"/>
+              <a:t> + </a:t>
+            </a:r>
+            <a:r>
+              <a:rPr lang="en-US" dirty="0" err="1" smtClean="0"/>
+              <a:t>threadIdx.x</a:t>
+            </a:r>
+            <a:r>
+              <a:rPr lang="en-US" dirty="0" smtClean="0"/>
+              <a:t>;</a:t>
+            </a:r>
+          </a:p>
+          <a:p>
+            <a:endParaRPr lang="en-US" dirty="0" smtClean="0"/>
+          </a:p>
+          <a:p>
+            <a:r>
+              <a:rPr lang="en-US" dirty="0" smtClean="0"/>
+              <a:t>	//return if over the length</a:t>
+            </a:r>
+          </a:p>
+          <a:p>
+            <a:r>
+              <a:rPr lang="en-US" dirty="0" smtClean="0"/>
+              <a:t>	if(row&gt;=</a:t>
+            </a:r>
+            <a:r>
+              <a:rPr lang="en-US" dirty="0" err="1" smtClean="0"/>
+              <a:t>len</a:t>
+            </a:r>
+            <a:r>
+              <a:rPr lang="en-US" dirty="0" smtClean="0"/>
+              <a:t> | col&gt;=</a:t>
+            </a:r>
+            <a:r>
+              <a:rPr lang="en-US" dirty="0" err="1" smtClean="0"/>
+              <a:t>len</a:t>
+            </a:r>
+            <a:r>
+              <a:rPr lang="en-US" dirty="0" smtClean="0"/>
+              <a:t>){return;}</a:t>
+            </a:r>
+          </a:p>
+          <a:p>
+            <a:endParaRPr lang="en-US" dirty="0" smtClean="0"/>
+          </a:p>
+          <a:p>
+            <a:r>
+              <a:rPr lang="en-US" dirty="0"/>
+              <a:t>	</a:t>
+            </a:r>
+            <a:r>
+              <a:rPr lang="en-US" dirty="0" smtClean="0"/>
+              <a:t>// do something…</a:t>
+            </a:r>
+            <a:endParaRPr lang="en-US" dirty="0"/>
+          </a:p>
+          <a:p>
+            <a:r>
+              <a:rPr lang="en-US" dirty="0" smtClean="0"/>
+              <a:t>	a[row*</a:t>
+            </a:r>
+            <a:r>
+              <a:rPr lang="en-US" dirty="0" err="1" smtClean="0"/>
+              <a:t>len</a:t>
+            </a:r>
+            <a:r>
+              <a:rPr lang="en-US" dirty="0" smtClean="0"/>
+              <a:t> + col] = </a:t>
+            </a:r>
+            <a:r>
+              <a:rPr lang="en-US" dirty="0" err="1" smtClean="0"/>
+              <a:t>d_add</a:t>
+            </a:r>
+            <a:r>
+              <a:rPr lang="en-US" dirty="0" smtClean="0"/>
+              <a:t>(1,2);</a:t>
+            </a:r>
+          </a:p>
+          <a:p>
+            <a:endParaRPr lang="en-US" dirty="0"/>
+          </a:p>
+          <a:p>
+            <a:r>
+              <a:rPr lang="en-US" dirty="0" smtClean="0"/>
+              <a:t>}</a:t>
+            </a:r>
+            <a:endParaRPr lang="en-US" dirty="0"/>
+          </a:p>
+        </p:txBody>
+      </p:sp>
+    </p:spTree>
+    <p:extLst>
+      <p:ext uri="{BB962C8B-B14F-4D97-AF65-F5344CB8AC3E}">
+        <p14:creationId xmlns:p14="http://schemas.microsoft.com/office/powerpoint/2010/main" val="1080336790"/>
+      </p:ext>
+    </p:extLst>
+  </p:cSld>
+  <p:clrMapOvr>
+    <a:masterClrMapping/>
+  </p:clrMapOvr>
+</p:sld>
+</file>
+
+<file path=ppt/slides/slide12.xml><?xml version="1.0" encoding="utf-8"?>
+<p:sld xmlns:a="http://schemas.openxmlformats.org/drawingml/2006/main" xmlns:r="http://schemas.openxmlformats.org/officeDocument/2006/relationships" xmlns:p="http://schemas.openxmlformats.org/presentationml/2006/main">
+  <p:cSld>
+    <p:spTree>
+      <p:nvGrpSpPr>
+        <p:cNvPr id="1" name=""/>
+        <p:cNvGrpSpPr/>
+        <p:nvPr/>
+      </p:nvGrpSpPr>
+      <p:grpSpPr>
+        <a:xfrm>
+          <a:off x="0" y="0"/>
+          <a:ext cx="0" cy="0"/>
+          <a:chOff x="0" y="0"/>
+          <a:chExt cx="0" cy="0"/>
+        </a:xfrm>
+      </p:grpSpPr>
+      <p:sp>
+        <p:nvSpPr>
+          <p:cNvPr id="2" name="Title 1"/>
+          <p:cNvSpPr>
+            <a:spLocks noGrp="1"/>
+          </p:cNvSpPr>
+          <p:nvPr>
+            <p:ph type="title"/>
+          </p:nvPr>
+        </p:nvSpPr>
+        <p:spPr/>
+        <p:txBody>
+          <a:bodyPr/>
+          <a:lstStyle/>
+          <a:p>
+            <a:r>
+              <a:rPr lang="en-US" dirty="0" smtClean="0"/>
               <a:t>Shared Memory, as in CUDA</a:t>
             </a:r>
             <a:endParaRPr lang="en-US" dirty="0"/>
@@ -3614,13 +3807,8 @@
           <a:p>
             <a:r>
               <a:rPr lang="en-US" dirty="0" smtClean="0"/>
-              <a:t>Small, 16-</a:t>
-            </a:r>
-            <a:r>
-              <a:rPr lang="en-US" dirty="0" smtClean="0"/>
-              <a:t>48kB</a:t>
-            </a:r>
-            <a:endParaRPr lang="en-US" dirty="0" smtClean="0"/>
+              <a:t>Small, 16-48kB</a:t>
+            </a:r>
           </a:p>
           <a:p>
             <a:r>
@@ -3712,7 +3900,7 @@
 </p:sld>
 </file>
 
-<file path=ppt/slides/slide12.xml><?xml version="1.0" encoding="utf-8"?>
+<file path=ppt/slides/slide13.xml><?xml version="1.0" encoding="utf-8"?>
 <p:sld xmlns:a="http://schemas.openxmlformats.org/drawingml/2006/main" xmlns:r="http://schemas.openxmlformats.org/officeDocument/2006/relationships" xmlns:p="http://schemas.openxmlformats.org/presentationml/2006/main">
   <p:cSld>
     <p:spTree>
@@ -3731,7 +3919,7 @@
       </p:grpSpPr>
       <p:sp>
         <p:nvSpPr>
-          <p:cNvPr id="6" name="Title 5"/>
+          <p:cNvPr id="3" name="Title 2"/>
           <p:cNvSpPr>
             <a:spLocks noGrp="1"/>
           </p:cNvSpPr>
@@ -3739,24 +3927,161 @@
             <p:ph type="title"/>
           </p:nvPr>
         </p:nvSpPr>
-        <p:spPr>
-          <a:xfrm>
-            <a:off x="457200" y="2625389"/>
-            <a:ext cx="8229600" cy="1143000"/>
-          </a:xfrm>
-        </p:spPr>
-        <p:txBody>
-          <a:bodyPr/>
-          <a:lstStyle/>
-          <a:p>
-            <a:r>
-              <a:rPr lang="en-US" dirty="0" smtClean="0"/>
-              <a:t>Now let’s try it!</a:t>
+        <p:spPr/>
+        <p:txBody>
+          <a:bodyPr/>
+          <a:lstStyle/>
+          <a:p>
+            <a:r>
+              <a:rPr lang="en-US" dirty="0" smtClean="0"/>
+              <a:t>Let’s Try It Out!	</a:t>
             </a:r>
             <a:endParaRPr lang="en-US" dirty="0"/>
           </a:p>
         </p:txBody>
       </p:sp>
+      <p:sp>
+        <p:nvSpPr>
+          <p:cNvPr id="4" name="Content Placeholder 3"/>
+          <p:cNvSpPr>
+            <a:spLocks noGrp="1"/>
+          </p:cNvSpPr>
+          <p:nvPr>
+            <p:ph idx="1"/>
+          </p:nvPr>
+        </p:nvSpPr>
+        <p:spPr/>
+        <p:txBody>
+          <a:bodyPr>
+            <a:normAutofit/>
+          </a:bodyPr>
+          <a:lstStyle/>
+          <a:p>
+            <a:r>
+              <a:rPr lang="en-US" dirty="0" smtClean="0"/>
+              <a:t>Matrix-Matrix Multiply</a:t>
+            </a:r>
+          </a:p>
+          <a:p>
+            <a:endParaRPr lang="en-US" dirty="0" smtClean="0"/>
+          </a:p>
+          <a:p>
+            <a:pPr lvl="1"/>
+            <a:endParaRPr lang="en-US" dirty="0" smtClean="0"/>
+          </a:p>
+          <a:p>
+            <a:pPr lvl="1"/>
+            <a:r>
+              <a:rPr lang="en-US" dirty="0" smtClean="0"/>
+              <a:t>For each output element</a:t>
+            </a:r>
+          </a:p>
+          <a:p>
+            <a:pPr lvl="2"/>
+            <a:r>
+              <a:rPr lang="en-US" dirty="0" smtClean="0"/>
+              <a:t>2N global loads</a:t>
+            </a:r>
+          </a:p>
+          <a:p>
+            <a:pPr lvl="2"/>
+            <a:r>
+              <a:rPr lang="en-US" dirty="0" smtClean="0"/>
+              <a:t>N multiplies, N-1 additions (cheap)</a:t>
+            </a:r>
+          </a:p>
+          <a:p>
+            <a:pPr lvl="2"/>
+            <a:r>
+              <a:rPr lang="en-US" dirty="0" smtClean="0"/>
+              <a:t>1 write</a:t>
+            </a:r>
+          </a:p>
+          <a:p>
+            <a:pPr lvl="1"/>
+            <a:r>
+              <a:rPr lang="en-US" dirty="0" smtClean="0"/>
+              <a:t>Memory </a:t>
+            </a:r>
+            <a:r>
+              <a:rPr lang="en-US" dirty="0" smtClean="0"/>
+              <a:t>bandwidth bound </a:t>
+            </a:r>
+            <a:r>
+              <a:rPr lang="en-US" dirty="0" smtClean="0"/>
+              <a:t>most likely</a:t>
+            </a:r>
+          </a:p>
+          <a:p>
+            <a:pPr lvl="2"/>
+            <a:r>
+              <a:rPr lang="en-US" dirty="0" smtClean="0"/>
+              <a:t>Very sensitive to memory </a:t>
+            </a:r>
+            <a:r>
+              <a:rPr lang="en-US" dirty="0" smtClean="0"/>
+              <a:t>access</a:t>
+            </a:r>
+          </a:p>
+        </p:txBody>
+      </p:sp>
+      <p:graphicFrame>
+        <p:nvGraphicFramePr>
+          <p:cNvPr id="5" name="Object 4"/>
+          <p:cNvGraphicFramePr>
+            <a:graphicFrameLocks noChangeAspect="1"/>
+          </p:cNvGraphicFramePr>
+          <p:nvPr>
+            <p:extLst>
+              <p:ext uri="{D42A27DB-BD31-4B8C-83A1-F6EECF244321}">
+                <p14:modId xmlns:p14="http://schemas.microsoft.com/office/powerpoint/2010/main" val="3853130298"/>
+              </p:ext>
+            </p:extLst>
+          </p:nvPr>
+        </p:nvGraphicFramePr>
+        <p:xfrm>
+          <a:off x="2150146" y="2208165"/>
+          <a:ext cx="2016740" cy="1022572"/>
+        </p:xfrm>
+        <a:graphic>
+          <a:graphicData uri="http://schemas.openxmlformats.org/presentationml/2006/ole">
+            <mc:AlternateContent xmlns:mc="http://schemas.openxmlformats.org/markup-compatibility/2006">
+              <mc:Choice xmlns:v="urn:schemas-microsoft-com:vml" Requires="v">
+                <p:oleObj spid="_x0000_s1051" name="Equation" r:id="rId3" imgW="901700" imgH="457200" progId="Equation.3">
+                  <p:embed/>
+                </p:oleObj>
+              </mc:Choice>
+              <mc:Fallback>
+                <p:oleObj name="Equation" r:id="rId3" imgW="901700" imgH="457200" progId="Equation.3">
+                  <p:embed/>
+                  <p:pic>
+                    <p:nvPicPr>
+                      <p:cNvPr id="0" name=""/>
+                      <p:cNvPicPr/>
+                      <p:nvPr/>
+                    </p:nvPicPr>
+                    <p:blipFill>
+                      <a:blip r:embed="rId4"/>
+                      <a:stretch>
+                        <a:fillRect/>
+                      </a:stretch>
+                    </p:blipFill>
+                    <p:spPr>
+                      <a:xfrm>
+                        <a:off x="2150146" y="2208165"/>
+                        <a:ext cx="2016740" cy="1022572"/>
+                      </a:xfrm>
+                      <a:prstGeom prst="rect">
+                        <a:avLst/>
+                      </a:prstGeom>
+                    </p:spPr>
+                  </p:pic>
+                </p:oleObj>
+              </mc:Fallback>
+            </mc:AlternateContent>
+          </a:graphicData>
+        </a:graphic>
+      </p:graphicFrame>
     </p:spTree>
     <p:extLst>
       <p:ext uri="{BB962C8B-B14F-4D97-AF65-F5344CB8AC3E}">
@@ -3828,13 +4153,51 @@
         </p:spPr>
         <p:txBody>
           <a:bodyPr>
-            <a:normAutofit fontScale="92500" lnSpcReduction="10000"/>
+            <a:normAutofit fontScale="92500" lnSpcReduction="20000"/>
           </a:bodyPr>
           <a:lstStyle/>
           <a:p>
             <a:r>
-              <a:rPr lang="en-US" dirty="0" smtClean="0"/>
-              <a:t>Shared memory machine with large SIMD lanes</a:t>
+              <a:rPr lang="en-US" u="sng" dirty="0" smtClean="0"/>
+              <a:t>C</a:t>
+            </a:r>
+            <a:r>
+              <a:rPr lang="en-US" dirty="0" smtClean="0"/>
+              <a:t>ompute </a:t>
+            </a:r>
+            <a:r>
+              <a:rPr lang="en-US" u="sng" dirty="0" smtClean="0"/>
+              <a:t>U</a:t>
+            </a:r>
+            <a:r>
+              <a:rPr lang="en-US" dirty="0" smtClean="0"/>
+              <a:t>nified </a:t>
+            </a:r>
+            <a:r>
+              <a:rPr lang="en-US" u="sng" dirty="0" smtClean="0"/>
+              <a:t>D</a:t>
+            </a:r>
+            <a:r>
+              <a:rPr lang="en-US" dirty="0" smtClean="0"/>
+              <a:t>evice </a:t>
+            </a:r>
+            <a:r>
+              <a:rPr lang="en-US" u="sng" dirty="0" smtClean="0"/>
+              <a:t>A</a:t>
+            </a:r>
+            <a:r>
+              <a:rPr lang="en-US" dirty="0" smtClean="0"/>
+              <a:t>rchitecture</a:t>
+            </a:r>
+          </a:p>
+          <a:p>
+            <a:r>
+              <a:rPr lang="en-US" dirty="0" smtClean="0"/>
+              <a:t>Shared </a:t>
+            </a:r>
+            <a:r>
+              <a:rPr lang="en-US" dirty="0" smtClean="0"/>
+              <a:t>memory machine with large SIMD lanes</a:t>
             </a:r>
           </a:p>
           <a:p>
@@ -4040,6 +4403,265 @@
           <a:chExt cx="0" cy="0"/>
         </a:xfrm>
       </p:grpSpPr>
+      <p:pic>
+        <p:nvPicPr>
+          <p:cNvPr id="6" name="Picture 5" descr="screenshot-1.png"/>
+          <p:cNvPicPr>
+            <a:picLocks noChangeAspect="1"/>
+          </p:cNvPicPr>
+          <p:nvPr/>
+        </p:nvPicPr>
+        <p:blipFill rotWithShape="1">
+          <a:blip r:embed="rId2">
+            <a:extLst>
+              <a:ext uri="{28A0092B-C50C-407E-A947-70E740481C1C}">
+                <a14:useLocalDpi xmlns:a14="http://schemas.microsoft.com/office/drawing/2010/main" val="0"/>
+              </a:ext>
+            </a:extLst>
+          </a:blip>
+          <a:srcRect l="53147"/>
+          <a:stretch/>
+        </p:blipFill>
+        <p:spPr>
+          <a:xfrm>
+            <a:off x="5607279" y="3371623"/>
+            <a:ext cx="2892123" cy="2463079"/>
+          </a:xfrm>
+          <a:prstGeom prst="rect">
+            <a:avLst/>
+          </a:prstGeom>
+        </p:spPr>
+      </p:pic>
+      <p:pic>
+        <p:nvPicPr>
+          <p:cNvPr id="5" name="Picture 4" descr="screenshot-1.png"/>
+          <p:cNvPicPr>
+            <a:picLocks noChangeAspect="1"/>
+          </p:cNvPicPr>
+          <p:nvPr/>
+        </p:nvPicPr>
+        <p:blipFill rotWithShape="1">
+          <a:blip r:embed="rId2">
+            <a:extLst>
+              <a:ext uri="{28A0092B-C50C-407E-A947-70E740481C1C}">
+                <a14:useLocalDpi xmlns:a14="http://schemas.microsoft.com/office/drawing/2010/main" val="0"/>
+              </a:ext>
+            </a:extLst>
+          </a:blip>
+          <a:srcRect r="53147"/>
+          <a:stretch/>
+        </p:blipFill>
+        <p:spPr>
+          <a:xfrm>
+            <a:off x="5713103" y="1086891"/>
+            <a:ext cx="2892123" cy="2463079"/>
+          </a:xfrm>
+          <a:prstGeom prst="rect">
+            <a:avLst/>
+          </a:prstGeom>
+        </p:spPr>
+      </p:pic>
+      <p:sp>
+        <p:nvSpPr>
+          <p:cNvPr id="2" name="Title 1"/>
+          <p:cNvSpPr>
+            <a:spLocks noGrp="1"/>
+          </p:cNvSpPr>
+          <p:nvPr>
+            <p:ph type="title"/>
+          </p:nvPr>
+        </p:nvSpPr>
+        <p:spPr/>
+        <p:txBody>
+          <a:bodyPr/>
+          <a:lstStyle/>
+          <a:p>
+            <a:r>
+              <a:rPr lang="en-US" dirty="0" smtClean="0"/>
+              <a:t>GPU Transistor Space and Specs</a:t>
+            </a:r>
+            <a:endParaRPr lang="en-US" dirty="0"/>
+          </a:p>
+        </p:txBody>
+      </p:sp>
+      <p:sp>
+        <p:nvSpPr>
+          <p:cNvPr id="3" name="Content Placeholder 2"/>
+          <p:cNvSpPr>
+            <a:spLocks noGrp="1"/>
+          </p:cNvSpPr>
+          <p:nvPr>
+            <p:ph idx="1"/>
+          </p:nvPr>
+        </p:nvSpPr>
+        <p:spPr>
+          <a:xfrm>
+            <a:off x="457200" y="5331612"/>
+            <a:ext cx="8229600" cy="1402360"/>
+          </a:xfrm>
+        </p:spPr>
+        <p:txBody>
+          <a:bodyPr>
+            <a:normAutofit fontScale="62500" lnSpcReduction="20000"/>
+          </a:bodyPr>
+          <a:lstStyle/>
+          <a:p>
+            <a:r>
+              <a:rPr lang="en-US" dirty="0" smtClean="0"/>
+              <a:t>Large </a:t>
+            </a:r>
+            <a:r>
+              <a:rPr lang="en-US" u="sng" dirty="0" smtClean="0"/>
+              <a:t>aggregate</a:t>
+            </a:r>
+            <a:r>
+              <a:rPr lang="en-US" dirty="0" smtClean="0"/>
+              <a:t> bandwidth </a:t>
+            </a:r>
+          </a:p>
+          <a:p>
+            <a:r>
+              <a:rPr lang="en-US" dirty="0" smtClean="0"/>
+              <a:t>Lots of arithmetic units</a:t>
+            </a:r>
+          </a:p>
+          <a:p>
+            <a:r>
+              <a:rPr lang="en-US" dirty="0" smtClean="0"/>
+              <a:t>But! FLOPs/Byte = 8.2, which is higher than 5.2 for a CPU</a:t>
+            </a:r>
+          </a:p>
+          <a:p>
+            <a:r>
+              <a:rPr lang="en-US" dirty="0" smtClean="0"/>
+              <a:t>Good for turning a compute-bound problem into a memory-bound one</a:t>
+            </a:r>
+            <a:endParaRPr lang="en-US" dirty="0"/>
+          </a:p>
+        </p:txBody>
+      </p:sp>
+      <p:pic>
+        <p:nvPicPr>
+          <p:cNvPr id="7" name="Picture 6"/>
+          <p:cNvPicPr>
+            <a:picLocks noChangeAspect="1"/>
+          </p:cNvPicPr>
+          <p:nvPr/>
+        </p:nvPicPr>
+        <p:blipFill>
+          <a:blip r:embed="rId3"/>
+          <a:stretch>
+            <a:fillRect/>
+          </a:stretch>
+        </p:blipFill>
+        <p:spPr>
+          <a:xfrm>
+            <a:off x="583717" y="1245651"/>
+            <a:ext cx="4768384" cy="4141682"/>
+          </a:xfrm>
+          <a:prstGeom prst="rect">
+            <a:avLst/>
+          </a:prstGeom>
+        </p:spPr>
+      </p:pic>
+      <p:sp>
+        <p:nvSpPr>
+          <p:cNvPr id="8" name="TextBox 7"/>
+          <p:cNvSpPr txBox="1"/>
+          <p:nvPr/>
+        </p:nvSpPr>
+        <p:spPr>
+          <a:xfrm>
+            <a:off x="6117325" y="5630052"/>
+            <a:ext cx="2291425" cy="246221"/>
+          </a:xfrm>
+          <a:prstGeom prst="rect">
+            <a:avLst/>
+          </a:prstGeom>
+          <a:noFill/>
+        </p:spPr>
+        <p:txBody>
+          <a:bodyPr wrap="none" rtlCol="0">
+            <a:spAutoFit/>
+          </a:bodyPr>
+          <a:lstStyle/>
+          <a:p>
+            <a:r>
+              <a:rPr lang="en-US" sz="1000" dirty="0" smtClean="0"/>
+              <a:t>CUDA C Programming Guide, NVIDIA Co.</a:t>
+            </a:r>
+            <a:endParaRPr lang="en-US" sz="1000" dirty="0"/>
+          </a:p>
+        </p:txBody>
+      </p:sp>
+      <p:sp>
+        <p:nvSpPr>
+          <p:cNvPr id="9" name="TextBox 8"/>
+          <p:cNvSpPr txBox="1"/>
+          <p:nvPr/>
+        </p:nvSpPr>
+        <p:spPr>
+          <a:xfrm>
+            <a:off x="583716" y="1073661"/>
+            <a:ext cx="2233893" cy="246221"/>
+          </a:xfrm>
+          <a:prstGeom prst="rect">
+            <a:avLst/>
+          </a:prstGeom>
+          <a:noFill/>
+        </p:spPr>
+        <p:txBody>
+          <a:bodyPr wrap="square" rtlCol="0">
+            <a:spAutoFit/>
+          </a:bodyPr>
+          <a:lstStyle/>
+          <a:p>
+            <a:r>
+              <a:rPr lang="en-US" sz="1000" dirty="0"/>
+              <a:t>B. </a:t>
+            </a:r>
+            <a:r>
+              <a:rPr lang="en-US" sz="1000" dirty="0" smtClean="0"/>
+              <a:t>Catanzaro</a:t>
+            </a:r>
+            <a:r>
+              <a:rPr lang="en-US" sz="1000" dirty="0" smtClean="0"/>
+              <a:t>, CS267, Spring 2011 slides</a:t>
+            </a:r>
+            <a:endParaRPr lang="en-US" sz="1000" dirty="0"/>
+          </a:p>
+        </p:txBody>
+      </p:sp>
+    </p:spTree>
+    <p:extLst>
+      <p:ext uri="{BB962C8B-B14F-4D97-AF65-F5344CB8AC3E}">
+        <p14:creationId xmlns:p14="http://schemas.microsoft.com/office/powerpoint/2010/main" val="647576381"/>
+      </p:ext>
+    </p:extLst>
+  </p:cSld>
+  <p:clrMapOvr>
+    <a:masterClrMapping/>
+  </p:clrMapOvr>
+</p:sld>
+</file>
+
+<file path=ppt/slides/slide5.xml><?xml version="1.0" encoding="utf-8"?>
+<p:sld xmlns:a="http://schemas.openxmlformats.org/drawingml/2006/main" xmlns:r="http://schemas.openxmlformats.org/officeDocument/2006/relationships" xmlns:p="http://schemas.openxmlformats.org/presentationml/2006/main">
+  <p:cSld>
+    <p:spTree>
+      <p:nvGrpSpPr>
+        <p:cNvPr id="1" name=""/>
+        <p:cNvGrpSpPr/>
+        <p:nvPr/>
+      </p:nvGrpSpPr>
+      <p:grpSpPr>
+        <a:xfrm>
+          <a:off x="0" y="0"/>
+          <a:ext cx="0" cy="0"/>
+          <a:chOff x="0" y="0"/>
+          <a:chExt cx="0" cy="0"/>
+        </a:xfrm>
+      </p:grpSpPr>
       <p:sp>
         <p:nvSpPr>
           <p:cNvPr id="2" name="Title 1"/>
@@ -4093,11 +4715,7 @@
           <a:p>
             <a:r>
               <a:rPr lang="en-US" dirty="0" smtClean="0"/>
-              <a:t>Amortize control overhead over SIMD </a:t>
-            </a:r>
-            <a:r>
-              <a:rPr lang="en-US" dirty="0" smtClean="0"/>
-              <a:t>width</a:t>
+              <a:t>Amortize control overhead over SIMD width</a:t>
             </a:r>
           </a:p>
           <a:p>
@@ -4212,7 +4830,7 @@
 </p:sld>
 </file>
 
-<file path=ppt/slides/slide5.xml><?xml version="1.0" encoding="utf-8"?>
+<file path=ppt/slides/slide6.xml><?xml version="1.0" encoding="utf-8"?>
 <p:sld xmlns:a="http://schemas.openxmlformats.org/drawingml/2006/main" xmlns:r="http://schemas.openxmlformats.org/officeDocument/2006/relationships" xmlns:p="http://schemas.openxmlformats.org/presentationml/2006/main">
   <p:cSld>
     <p:spTree>
@@ -4271,22 +4889,14 @@
           <a:p>
             <a:r>
               <a:rPr lang="en-US" dirty="0" smtClean="0"/>
-              <a:t>Hex-core </a:t>
-            </a:r>
-            <a:r>
-              <a:rPr lang="en-US" dirty="0" smtClean="0"/>
-              <a:t>CPU</a:t>
+              <a:t>Hex-core CPU</a:t>
             </a:r>
           </a:p>
           <a:p>
             <a:pPr lvl="1"/>
             <a:r>
               <a:rPr lang="en-US" dirty="0" smtClean="0"/>
-              <a:t>6 </a:t>
-            </a:r>
-            <a:r>
-              <a:rPr lang="en-US" dirty="0" smtClean="0"/>
-              <a:t>cores, 2 issue, 4-way </a:t>
+              <a:t>6 cores, 2 issue, 4-way </a:t>
             </a:r>
             <a:r>
               <a:rPr lang="en-US" dirty="0"/>
@@ -4308,13 +4918,8 @@
             <a:pPr lvl="1"/>
             <a:r>
               <a:rPr lang="en-US" dirty="0" smtClean="0"/>
-              <a:t>14 cores, 2 issue, 16-way </a:t>
-            </a:r>
-            <a:r>
-              <a:rPr lang="en-US" dirty="0" smtClean="0"/>
-              <a:t>SIMD, 1.54GHz</a:t>
-            </a:r>
-            <a:endParaRPr lang="en-US" dirty="0" smtClean="0"/>
+              <a:t>14 cores, 2 issue, 16-way SIMD, 1.54GHz</a:t>
+            </a:r>
           </a:p>
           <a:p>
             <a:pPr lvl="1"/>
@@ -4349,7 +4954,7 @@
 </p:sld>
 </file>
 
-<file path=ppt/slides/slide6.xml><?xml version="1.0" encoding="utf-8"?>
+<file path=ppt/slides/slide7.xml><?xml version="1.0" encoding="utf-8"?>
 <p:sld xmlns:a="http://schemas.openxmlformats.org/drawingml/2006/main" xmlns:r="http://schemas.openxmlformats.org/officeDocument/2006/relationships" xmlns:p="http://schemas.openxmlformats.org/presentationml/2006/main">
   <p:cSld>
     <p:spTree>
@@ -4518,7 +5123,7 @@
 </p:sld>
 </file>
 
-<file path=ppt/slides/slide7.xml><?xml version="1.0" encoding="utf-8"?>
+<file path=ppt/slides/slide8.xml><?xml version="1.0" encoding="utf-8"?>
 <p:sld xmlns:a="http://schemas.openxmlformats.org/drawingml/2006/main" xmlns:r="http://schemas.openxmlformats.org/officeDocument/2006/relationships" xmlns:p="http://schemas.openxmlformats.org/presentationml/2006/main">
   <p:cSld>
     <p:spTree>
@@ -4594,15 +5199,7 @@
             <a:pPr lvl="1"/>
             <a:r>
               <a:rPr lang="en-US" dirty="0" smtClean="0"/>
-              <a:t>Kernel is a serial program </a:t>
-            </a:r>
-            <a:r>
-              <a:rPr lang="en-US" dirty="0" smtClean="0"/>
-              <a:t>performed by </a:t>
-            </a:r>
-            <a:r>
-              <a:rPr lang="en-US" dirty="0" smtClean="0"/>
-              <a:t>all threads</a:t>
+              <a:t>Kernel is a serial program performed by all threads</a:t>
             </a:r>
           </a:p>
           <a:p>
@@ -4735,7 +5332,7 @@
 </p:sld>
 </file>
 
-<file path=ppt/slides/slide8.xml><?xml version="1.0" encoding="utf-8"?>
+<file path=ppt/slides/slide9.xml><?xml version="1.0" encoding="utf-8"?>
 <p:sld xmlns:a="http://schemas.openxmlformats.org/drawingml/2006/main" xmlns:r="http://schemas.openxmlformats.org/officeDocument/2006/relationships" xmlns:p="http://schemas.openxmlformats.org/presentationml/2006/main">
   <p:cSld>
     <p:spTree>
@@ -4907,206 +5504,6 @@
     <p:extLst>
       <p:ext uri="{BB962C8B-B14F-4D97-AF65-F5344CB8AC3E}">
         <p14:creationId xmlns:p14="http://schemas.microsoft.com/office/powerpoint/2010/main" val="1345424966"/>
-      </p:ext>
-    </p:extLst>
-  </p:cSld>
-  <p:clrMapOvr>
-    <a:masterClrMapping/>
-  </p:clrMapOvr>
-</p:sld>
-</file>
-
-<file path=ppt/slides/slide9.xml><?xml version="1.0" encoding="utf-8"?>
-<p:sld xmlns:a="http://schemas.openxmlformats.org/drawingml/2006/main" xmlns:r="http://schemas.openxmlformats.org/officeDocument/2006/relationships" xmlns:p="http://schemas.openxmlformats.org/presentationml/2006/main">
-  <p:cSld>
-    <p:spTree>
-      <p:nvGrpSpPr>
-        <p:cNvPr id="1" name=""/>
-        <p:cNvGrpSpPr/>
-        <p:nvPr/>
-      </p:nvGrpSpPr>
-      <p:grpSpPr>
-        <a:xfrm>
-          <a:off x="0" y="0"/>
-          <a:ext cx="0" cy="0"/>
-          <a:chOff x="0" y="0"/>
-          <a:chExt cx="0" cy="0"/>
-        </a:xfrm>
-      </p:grpSpPr>
-      <p:sp>
-        <p:nvSpPr>
-          <p:cNvPr id="2" name="Title 1"/>
-          <p:cNvSpPr>
-            <a:spLocks noGrp="1"/>
-          </p:cNvSpPr>
-          <p:nvPr>
-            <p:ph type="title"/>
-          </p:nvPr>
-        </p:nvSpPr>
-        <p:spPr/>
-        <p:txBody>
-          <a:bodyPr/>
-          <a:lstStyle/>
-          <a:p>
-            <a:r>
-              <a:rPr lang="en-US" dirty="0" smtClean="0"/>
-              <a:t>Launching a Kernel From the Host</a:t>
-            </a:r>
-            <a:endParaRPr lang="en-US" dirty="0"/>
-          </a:p>
-        </p:txBody>
-      </p:sp>
-      <p:sp>
-        <p:nvSpPr>
-          <p:cNvPr id="3" name="Content Placeholder 2"/>
-          <p:cNvSpPr>
-            <a:spLocks noGrp="1"/>
-          </p:cNvSpPr>
-          <p:nvPr>
-            <p:ph idx="1"/>
-          </p:nvPr>
-        </p:nvSpPr>
-        <p:spPr>
-          <a:xfrm>
-            <a:off x="457200" y="1600200"/>
-            <a:ext cx="8229600" cy="4820977"/>
-          </a:xfrm>
-        </p:spPr>
-        <p:txBody>
-          <a:bodyPr>
-            <a:normAutofit/>
-          </a:bodyPr>
-          <a:lstStyle/>
-          <a:p>
-            <a:pPr marL="0" indent="0">
-              <a:buNone/>
-            </a:pPr>
-            <a:endParaRPr lang="en-US" sz="2200" dirty="0" smtClean="0"/>
-          </a:p>
-          <a:p>
-            <a:pPr marL="0" indent="0">
-              <a:buNone/>
-            </a:pPr>
-            <a:r>
-              <a:rPr lang="en-US" sz="2200" dirty="0" smtClean="0"/>
-              <a:t>kernel &lt;&lt;&lt; </a:t>
-            </a:r>
-            <a:r>
-              <a:rPr lang="en-US" sz="2200" dirty="0" err="1" smtClean="0"/>
-              <a:t>grid_dimensions</a:t>
-            </a:r>
-            <a:r>
-              <a:rPr lang="en-US" sz="2200" dirty="0" smtClean="0"/>
-              <a:t>  , </a:t>
-            </a:r>
-            <a:r>
-              <a:rPr lang="en-US" sz="2400" dirty="0" err="1" smtClean="0"/>
-              <a:t>block</a:t>
-            </a:r>
-            <a:r>
-              <a:rPr lang="en-US" sz="2200" dirty="0" err="1" smtClean="0"/>
-              <a:t>_dimensions</a:t>
-            </a:r>
-            <a:r>
-              <a:rPr lang="en-US" sz="2200" dirty="0" smtClean="0"/>
-              <a:t> &gt;&gt;&gt; (arguments);</a:t>
-            </a:r>
-          </a:p>
-          <a:p>
-            <a:pPr marL="0" indent="0">
-              <a:buNone/>
-            </a:pPr>
-            <a:endParaRPr lang="en-US" sz="2000" dirty="0" smtClean="0"/>
-          </a:p>
-          <a:p>
-            <a:pPr marL="0" indent="0">
-              <a:buNone/>
-            </a:pPr>
-            <a:endParaRPr lang="en-US" sz="2000" dirty="0"/>
-          </a:p>
-          <a:p>
-            <a:pPr marL="0" indent="0">
-              <a:buNone/>
-            </a:pPr>
-            <a:r>
-              <a:rPr lang="en-US" sz="2000" dirty="0" smtClean="0"/>
-              <a:t>kernel = the name of the kernel</a:t>
-            </a:r>
-          </a:p>
-          <a:p>
-            <a:pPr marL="0" indent="0">
-              <a:buNone/>
-            </a:pPr>
-            <a:r>
-              <a:rPr lang="en-US" sz="2000" dirty="0" err="1" smtClean="0"/>
-              <a:t>grid_dimensions</a:t>
-            </a:r>
-            <a:r>
-              <a:rPr lang="en-US" sz="2000" dirty="0" smtClean="0"/>
-              <a:t> = dim3(</a:t>
-            </a:r>
-            <a:r>
-              <a:rPr lang="en-US" sz="2000" dirty="0" err="1" smtClean="0"/>
-              <a:t>x,y,z</a:t>
-            </a:r>
-            <a:r>
-              <a:rPr lang="en-US" sz="2000" dirty="0" smtClean="0"/>
-              <a:t>) number of blocks in the (</a:t>
-            </a:r>
-            <a:r>
-              <a:rPr lang="en-US" sz="2000" dirty="0" err="1" smtClean="0"/>
-              <a:t>x,y,z</a:t>
-            </a:r>
-            <a:r>
-              <a:rPr lang="en-US" sz="2000" dirty="0" smtClean="0"/>
-              <a:t>) dimensions</a:t>
-            </a:r>
-          </a:p>
-          <a:p>
-            <a:pPr marL="0" indent="0">
-              <a:buNone/>
-            </a:pPr>
-            <a:r>
-              <a:rPr lang="en-US" sz="2000" dirty="0" err="1" smtClean="0"/>
-              <a:t>block_dimensions</a:t>
-            </a:r>
-            <a:r>
-              <a:rPr lang="en-US" sz="2000" dirty="0" smtClean="0"/>
-              <a:t> = dim3(</a:t>
-            </a:r>
-            <a:r>
-              <a:rPr lang="en-US" sz="2000" dirty="0" err="1" smtClean="0"/>
-              <a:t>x,y,z</a:t>
-            </a:r>
-            <a:r>
-              <a:rPr lang="en-US" sz="2000" dirty="0" smtClean="0"/>
-              <a:t>) number of threads in the (</a:t>
-            </a:r>
-            <a:r>
-              <a:rPr lang="en-US" sz="2000" dirty="0" err="1" smtClean="0"/>
-              <a:t>x,y,z</a:t>
-            </a:r>
-            <a:r>
-              <a:rPr lang="en-US" sz="2000" dirty="0" smtClean="0"/>
-              <a:t>) dimensions within a block</a:t>
-            </a:r>
-          </a:p>
-          <a:p>
-            <a:pPr marL="0" indent="0">
-              <a:buNone/>
-            </a:pPr>
-            <a:r>
-              <a:rPr lang="en-US" sz="2000" dirty="0" smtClean="0"/>
-              <a:t>arguments = input values, pointers to arrays, etc.</a:t>
-            </a:r>
-            <a:endParaRPr lang="en-US" sz="2000" dirty="0"/>
-          </a:p>
-        </p:txBody>
-      </p:sp>
-    </p:spTree>
-    <p:extLst>
-      <p:ext uri="{BB962C8B-B14F-4D97-AF65-F5344CB8AC3E}">
-        <p14:creationId xmlns:p14="http://schemas.microsoft.com/office/powerpoint/2010/main" val="1041839434"/>
       </p:ext>
     </p:extLst>
   </p:cSld>

</xml_diff>

<commit_message>
Final revisions part trois
</commit_message>
<xml_diff>
--- a/cuda_tut.pptx
+++ b/cuda_tut.pptx
@@ -3163,16 +3163,12 @@
               <a:t>Feb. </a:t>
             </a:r>
             <a:r>
-              <a:rPr lang="en-US"/>
+              <a:rPr lang="en-US" dirty="0"/>
               <a:t>5</a:t>
             </a:r>
             <a:r>
-              <a:rPr lang="en-US" smtClean="0"/>
-              <a:t>, </a:t>
-            </a:r>
-            <a:r>
-              <a:rPr lang="en-US" dirty="0" smtClean="0"/>
-              <a:t>2014</a:t>
+              <a:rPr lang="en-US" dirty="0" smtClean="0"/>
+              <a:t>, 2014</a:t>
             </a:r>
             <a:endParaRPr lang="en-US" dirty="0"/>
           </a:p>
@@ -3395,6 +3391,13 @@
   <p:clrMapOvr>
     <a:masterClrMapping/>
   </p:clrMapOvr>
+  <p:timing>
+    <p:tnLst>
+      <p:par>
+        <p:cTn xmlns:p14="http://schemas.microsoft.com/office/powerpoint/2010/main" id="1" dur="indefinite" restart="never" nodeType="tmRoot"/>
+      </p:par>
+    </p:tnLst>
+  </p:timing>
 </p:sld>
 </file>
 
@@ -3749,6 +3752,13 @@
   <p:clrMapOvr>
     <a:masterClrMapping/>
   </p:clrMapOvr>
+  <p:timing>
+    <p:tnLst>
+      <p:par>
+        <p:cTn xmlns:p14="http://schemas.microsoft.com/office/powerpoint/2010/main" id="1" dur="indefinite" restart="never" nodeType="tmRoot"/>
+      </p:par>
+    </p:tnLst>
+  </p:timing>
 </p:sld>
 </file>
 
@@ -3916,6 +3926,13 @@
   <p:clrMapOvr>
     <a:masterClrMapping/>
   </p:clrMapOvr>
+  <p:timing>
+    <p:tnLst>
+      <p:par>
+        <p:cTn xmlns:p14="http://schemas.microsoft.com/office/powerpoint/2010/main" id="1" dur="indefinite" restart="never" nodeType="tmRoot"/>
+      </p:par>
+    </p:tnLst>
+  </p:timing>
 </p:sld>
 </file>
 
@@ -4066,7 +4083,7 @@
           <a:graphicData uri="http://schemas.openxmlformats.org/presentationml/2006/ole">
             <mc:AlternateContent xmlns:mc="http://schemas.openxmlformats.org/markup-compatibility/2006">
               <mc:Choice xmlns:v="urn:schemas-microsoft-com:vml" Requires="v">
-                <p:oleObj spid="_x0000_s1058" name="Equation" r:id="rId3" imgW="901700" imgH="457200" progId="Equation.3">
+                <p:oleObj spid="_x0000_s1060" name="Equation" r:id="rId3" imgW="901700" imgH="457200" progId="Equation.3">
                   <p:embed/>
                 </p:oleObj>
               </mc:Choice>
@@ -4111,6 +4128,13 @@
   <p:clrMapOvr>
     <a:masterClrMapping/>
   </p:clrMapOvr>
+  <p:timing>
+    <p:tnLst>
+      <p:par>
+        <p:cTn xmlns:p14="http://schemas.microsoft.com/office/powerpoint/2010/main" id="1" dur="indefinite" restart="never" nodeType="tmRoot"/>
+      </p:par>
+    </p:tnLst>
+  </p:timing>
 </p:sld>
 </file>
 
@@ -4675,6 +4699,13 @@
   <p:clrMapOvr>
     <a:masterClrMapping/>
   </p:clrMapOvr>
+  <p:timing>
+    <p:tnLst>
+      <p:par>
+        <p:cTn xmlns:p14="http://schemas.microsoft.com/office/powerpoint/2010/main" id="1" dur="indefinite" restart="never" nodeType="tmRoot"/>
+      </p:par>
+    </p:tnLst>
+  </p:timing>
 </p:sld>
 </file>
 
@@ -4860,6 +4891,13 @@
   <p:clrMapOvr>
     <a:masterClrMapping/>
   </p:clrMapOvr>
+  <p:timing>
+    <p:tnLst>
+      <p:par>
+        <p:cTn xmlns:p14="http://schemas.microsoft.com/office/powerpoint/2010/main" id="1" dur="indefinite" restart="never" nodeType="tmRoot"/>
+      </p:par>
+    </p:tnLst>
+  </p:timing>
 </p:sld>
 </file>
 
@@ -4984,6 +5022,13 @@
   <p:clrMapOvr>
     <a:masterClrMapping/>
   </p:clrMapOvr>
+  <p:timing>
+    <p:tnLst>
+      <p:par>
+        <p:cTn xmlns:p14="http://schemas.microsoft.com/office/powerpoint/2010/main" id="1" dur="indefinite" restart="never" nodeType="tmRoot"/>
+      </p:par>
+    </p:tnLst>
+  </p:timing>
 </p:sld>
 </file>
 
@@ -5153,6 +5198,13 @@
   <p:clrMapOvr>
     <a:masterClrMapping/>
   </p:clrMapOvr>
+  <p:timing>
+    <p:tnLst>
+      <p:par>
+        <p:cTn xmlns:p14="http://schemas.microsoft.com/office/powerpoint/2010/main" id="1" dur="indefinite" restart="never" nodeType="tmRoot"/>
+      </p:par>
+    </p:tnLst>
+  </p:timing>
 </p:sld>
 </file>
 
@@ -5362,6 +5414,13 @@
   <p:clrMapOvr>
     <a:masterClrMapping/>
   </p:clrMapOvr>
+  <p:timing>
+    <p:tnLst>
+      <p:par>
+        <p:cTn xmlns:p14="http://schemas.microsoft.com/office/powerpoint/2010/main" id="1" dur="indefinite" restart="never" nodeType="tmRoot"/>
+      </p:par>
+    </p:tnLst>
+  </p:timing>
 </p:sld>
 </file>
 
@@ -5543,6 +5602,13 @@
   <p:clrMapOvr>
     <a:masterClrMapping/>
   </p:clrMapOvr>
+  <p:timing>
+    <p:tnLst>
+      <p:par>
+        <p:cTn xmlns:p14="http://schemas.microsoft.com/office/powerpoint/2010/main" id="1" dur="indefinite" restart="never" nodeType="tmRoot"/>
+      </p:par>
+    </p:tnLst>
+  </p:timing>
 </p:sld>
 </file>
 

</xml_diff>